<commit_message>
New feature: Modern Portfolio Therory
</commit_message>
<xml_diff>
--- a/Overview.pptx
+++ b/Overview.pptx
@@ -5560,10 +5560,7 @@
             <a:avLst/>
           </a:prstGeom>
           <a:solidFill>
-            <a:schemeClr val="accent1">
-              <a:lumMod val="20000"/>
-              <a:lumOff val="80000"/>
-            </a:schemeClr>
+            <a:schemeClr val="bg1"/>
           </a:solidFill>
           <a:ln w="19050">
             <a:solidFill>
@@ -5633,10 +5630,7 @@
             <a:avLst/>
           </a:prstGeom>
           <a:solidFill>
-            <a:schemeClr val="accent1">
-              <a:lumMod val="20000"/>
-              <a:lumOff val="80000"/>
-            </a:schemeClr>
+            <a:schemeClr val="bg1"/>
           </a:solidFill>
           <a:ln w="19050">
             <a:solidFill>
@@ -5706,10 +5700,7 @@
             <a:avLst/>
           </a:prstGeom>
           <a:solidFill>
-            <a:schemeClr val="accent1">
-              <a:lumMod val="20000"/>
-              <a:lumOff val="80000"/>
-            </a:schemeClr>
+            <a:schemeClr val="bg1"/>
           </a:solidFill>
           <a:ln w="19050">
             <a:solidFill>
@@ -5970,6 +5961,279 @@
           </a:fontRef>
         </p:style>
       </p:cxnSp>
+      <p:sp>
+        <p:nvSpPr>
+          <p:cNvPr id="6" name="Rectangle 5">
+            <a:extLst>
+              <a:ext uri="{FF2B5EF4-FFF2-40B4-BE49-F238E27FC236}">
+                <a16:creationId xmlns:a16="http://schemas.microsoft.com/office/drawing/2014/main" id="{32A2F509-2946-241F-851B-21EA51E46FFB}"/>
+              </a:ext>
+            </a:extLst>
+          </p:cNvPr>
+          <p:cNvSpPr/>
+          <p:nvPr/>
+        </p:nvSpPr>
+        <p:spPr>
+          <a:xfrm>
+            <a:off x="26280000" y="12239999"/>
+            <a:ext cx="7200000" cy="3600000"/>
+          </a:xfrm>
+          <a:prstGeom prst="rect">
+            <a:avLst/>
+          </a:prstGeom>
+          <a:noFill/>
+          <a:ln w="19050">
+            <a:solidFill>
+              <a:schemeClr val="tx1"/>
+            </a:solidFill>
+            <a:prstDash val="lgDash"/>
+          </a:ln>
+        </p:spPr>
+        <p:style>
+          <a:lnRef idx="2">
+            <a:schemeClr val="accent1">
+              <a:shade val="15000"/>
+            </a:schemeClr>
+          </a:lnRef>
+          <a:fillRef idx="1">
+            <a:schemeClr val="accent1"/>
+          </a:fillRef>
+          <a:effectRef idx="0">
+            <a:schemeClr val="accent1"/>
+          </a:effectRef>
+          <a:fontRef idx="minor">
+            <a:schemeClr val="lt1"/>
+          </a:fontRef>
+        </p:style>
+        <p:txBody>
+          <a:bodyPr rtlCol="0" anchor="t"/>
+          <a:lstStyle/>
+          <a:p>
+            <a:r>
+              <a:rPr lang="en-FR" i="1" dirty="0">
+                <a:solidFill>
+                  <a:sysClr val="windowText" lastClr="000000"/>
+                </a:solidFill>
+              </a:rPr>
+              <a:t>Portfolio Optimisation</a:t>
+            </a:r>
+          </a:p>
+        </p:txBody>
+      </p:sp>
+      <p:sp>
+        <p:nvSpPr>
+          <p:cNvPr id="8" name="Rectangle 7">
+            <a:extLst>
+              <a:ext uri="{FF2B5EF4-FFF2-40B4-BE49-F238E27FC236}">
+                <a16:creationId xmlns:a16="http://schemas.microsoft.com/office/drawing/2014/main" id="{2E4D12C8-A928-ABEC-5C70-10CD1CF053C1}"/>
+              </a:ext>
+            </a:extLst>
+          </p:cNvPr>
+          <p:cNvSpPr/>
+          <p:nvPr/>
+        </p:nvSpPr>
+        <p:spPr>
+          <a:xfrm>
+            <a:off x="26640000" y="12960000"/>
+            <a:ext cx="2880000" cy="1080000"/>
+          </a:xfrm>
+          <a:prstGeom prst="rect">
+            <a:avLst/>
+          </a:prstGeom>
+          <a:solidFill>
+            <a:schemeClr val="bg1"/>
+          </a:solidFill>
+          <a:ln w="19050">
+            <a:solidFill>
+              <a:schemeClr val="tx1"/>
+            </a:solidFill>
+            <a:prstDash val="lgDash"/>
+          </a:ln>
+        </p:spPr>
+        <p:style>
+          <a:lnRef idx="2">
+            <a:schemeClr val="accent1">
+              <a:shade val="15000"/>
+            </a:schemeClr>
+          </a:lnRef>
+          <a:fillRef idx="1">
+            <a:schemeClr val="accent1"/>
+          </a:fillRef>
+          <a:effectRef idx="0">
+            <a:schemeClr val="accent1"/>
+          </a:effectRef>
+          <a:fontRef idx="minor">
+            <a:schemeClr val="lt1"/>
+          </a:fontRef>
+        </p:style>
+        <p:txBody>
+          <a:bodyPr lIns="90000" numCol="1" rtlCol="0" anchor="t"/>
+          <a:lstStyle/>
+          <a:p>
+            <a:pPr algn="ctr"/>
+            <a:r>
+              <a:rPr lang="en-FR" b="1" dirty="0">
+                <a:solidFill>
+                  <a:sysClr val="windowText" lastClr="000000"/>
+                </a:solidFill>
+              </a:rPr>
+              <a:t>MPT.h</a:t>
+            </a:r>
+          </a:p>
+          <a:p>
+            <a:pPr marL="184150" indent="-184150"/>
+            <a:endParaRPr lang="en-FR" dirty="0">
+              <a:solidFill>
+                <a:sysClr val="windowText" lastClr="000000"/>
+              </a:solidFill>
+            </a:endParaRPr>
+          </a:p>
+          <a:p>
+            <a:pPr marL="184150" indent="-184150" algn="ctr"/>
+            <a:r>
+              <a:rPr lang="en-FR" dirty="0">
+                <a:solidFill>
+                  <a:sysClr val="windowText" lastClr="000000"/>
+                </a:solidFill>
+              </a:rPr>
+              <a:t>Modern Portfolio Theory</a:t>
+            </a:r>
+          </a:p>
+        </p:txBody>
+      </p:sp>
+      <p:sp>
+        <p:nvSpPr>
+          <p:cNvPr id="9" name="Rectangle 8">
+            <a:extLst>
+              <a:ext uri="{FF2B5EF4-FFF2-40B4-BE49-F238E27FC236}">
+                <a16:creationId xmlns:a16="http://schemas.microsoft.com/office/drawing/2014/main" id="{194DDE5A-31B9-E26A-7677-B6C5B4A307CB}"/>
+              </a:ext>
+            </a:extLst>
+          </p:cNvPr>
+          <p:cNvSpPr/>
+          <p:nvPr/>
+        </p:nvSpPr>
+        <p:spPr>
+          <a:xfrm>
+            <a:off x="29880000" y="12960000"/>
+            <a:ext cx="2880000" cy="1080000"/>
+          </a:xfrm>
+          <a:prstGeom prst="rect">
+            <a:avLst/>
+          </a:prstGeom>
+          <a:solidFill>
+            <a:schemeClr val="bg1"/>
+          </a:solidFill>
+          <a:ln w="19050">
+            <a:solidFill>
+              <a:schemeClr val="tx1"/>
+            </a:solidFill>
+            <a:prstDash val="lgDash"/>
+          </a:ln>
+        </p:spPr>
+        <p:style>
+          <a:lnRef idx="2">
+            <a:schemeClr val="accent1">
+              <a:shade val="15000"/>
+            </a:schemeClr>
+          </a:lnRef>
+          <a:fillRef idx="1">
+            <a:schemeClr val="accent1"/>
+          </a:fillRef>
+          <a:effectRef idx="0">
+            <a:schemeClr val="accent1"/>
+          </a:effectRef>
+          <a:fontRef idx="minor">
+            <a:schemeClr val="lt1"/>
+          </a:fontRef>
+        </p:style>
+        <p:txBody>
+          <a:bodyPr lIns="90000" numCol="1" rtlCol="0" anchor="t"/>
+          <a:lstStyle/>
+          <a:p>
+            <a:pPr algn="ctr"/>
+            <a:r>
+              <a:rPr lang="en-FR" b="1" dirty="0">
+                <a:solidFill>
+                  <a:sysClr val="windowText" lastClr="000000"/>
+                </a:solidFill>
+              </a:rPr>
+              <a:t>Risk.h</a:t>
+            </a:r>
+          </a:p>
+          <a:p>
+            <a:pPr marL="184150" indent="-184150"/>
+            <a:endParaRPr lang="en-FR" dirty="0">
+              <a:solidFill>
+                <a:sysClr val="windowText" lastClr="000000"/>
+              </a:solidFill>
+            </a:endParaRPr>
+          </a:p>
+        </p:txBody>
+      </p:sp>
+      <p:sp>
+        <p:nvSpPr>
+          <p:cNvPr id="10" name="Rectangle 9">
+            <a:extLst>
+              <a:ext uri="{FF2B5EF4-FFF2-40B4-BE49-F238E27FC236}">
+                <a16:creationId xmlns:a16="http://schemas.microsoft.com/office/drawing/2014/main" id="{5022B0A1-8961-5604-5773-E60C4DF4171A}"/>
+              </a:ext>
+            </a:extLst>
+          </p:cNvPr>
+          <p:cNvSpPr/>
+          <p:nvPr/>
+        </p:nvSpPr>
+        <p:spPr>
+          <a:xfrm>
+            <a:off x="3599463" y="12239999"/>
+            <a:ext cx="8280000" cy="8640000"/>
+          </a:xfrm>
+          <a:prstGeom prst="rect">
+            <a:avLst/>
+          </a:prstGeom>
+          <a:solidFill>
+            <a:schemeClr val="accent5">
+              <a:lumMod val="20000"/>
+              <a:lumOff val="80000"/>
+            </a:schemeClr>
+          </a:solidFill>
+          <a:ln w="19050">
+            <a:solidFill>
+              <a:schemeClr val="tx1"/>
+            </a:solidFill>
+          </a:ln>
+        </p:spPr>
+        <p:style>
+          <a:lnRef idx="2">
+            <a:schemeClr val="accent1">
+              <a:shade val="15000"/>
+            </a:schemeClr>
+          </a:lnRef>
+          <a:fillRef idx="1">
+            <a:schemeClr val="accent1"/>
+          </a:fillRef>
+          <a:effectRef idx="0">
+            <a:schemeClr val="accent1"/>
+          </a:effectRef>
+          <a:fontRef idx="minor">
+            <a:schemeClr val="lt1"/>
+          </a:fontRef>
+        </p:style>
+        <p:txBody>
+          <a:bodyPr rtlCol="0" anchor="t"/>
+          <a:lstStyle/>
+          <a:p>
+            <a:r>
+              <a:rPr lang="en-FR" i="1" dirty="0">
+                <a:solidFill>
+                  <a:sysClr val="windowText" lastClr="000000"/>
+                </a:solidFill>
+              </a:rPr>
+              <a:t>Data Base</a:t>
+            </a:r>
+          </a:p>
+        </p:txBody>
+      </p:sp>
     </p:spTree>
     <p:extLst>
       <p:ext uri="{BB962C8B-B14F-4D97-AF65-F5344CB8AC3E}">

</xml_diff>

<commit_message>
deeper levels of programming (threads & Assembly)
</commit_message>
<xml_diff>
--- a/Overview.pptx
+++ b/Overview.pptx
@@ -243,7 +243,7 @@
           <a:p>
             <a:fld id="{1436A7A7-0319-7F44-8F6C-B5CC412837B6}" type="datetimeFigureOut">
               <a:rPr lang="en-FR" smtClean="0"/>
-              <a:t>05/11/2024</a:t>
+              <a:t>23/11/2024</a:t>
             </a:fld>
             <a:endParaRPr lang="en-FR"/>
           </a:p>
@@ -413,7 +413,7 @@
           <a:p>
             <a:fld id="{1436A7A7-0319-7F44-8F6C-B5CC412837B6}" type="datetimeFigureOut">
               <a:rPr lang="en-FR" smtClean="0"/>
-              <a:t>05/11/2024</a:t>
+              <a:t>23/11/2024</a:t>
             </a:fld>
             <a:endParaRPr lang="en-FR"/>
           </a:p>
@@ -593,7 +593,7 @@
           <a:p>
             <a:fld id="{1436A7A7-0319-7F44-8F6C-B5CC412837B6}" type="datetimeFigureOut">
               <a:rPr lang="en-FR" smtClean="0"/>
-              <a:t>05/11/2024</a:t>
+              <a:t>23/11/2024</a:t>
             </a:fld>
             <a:endParaRPr lang="en-FR"/>
           </a:p>
@@ -763,7 +763,7 @@
           <a:p>
             <a:fld id="{1436A7A7-0319-7F44-8F6C-B5CC412837B6}" type="datetimeFigureOut">
               <a:rPr lang="en-FR" smtClean="0"/>
-              <a:t>05/11/2024</a:t>
+              <a:t>23/11/2024</a:t>
             </a:fld>
             <a:endParaRPr lang="en-FR"/>
           </a:p>
@@ -1009,7 +1009,7 @@
           <a:p>
             <a:fld id="{1436A7A7-0319-7F44-8F6C-B5CC412837B6}" type="datetimeFigureOut">
               <a:rPr lang="en-FR" smtClean="0"/>
-              <a:t>05/11/2024</a:t>
+              <a:t>23/11/2024</a:t>
             </a:fld>
             <a:endParaRPr lang="en-FR"/>
           </a:p>
@@ -1241,7 +1241,7 @@
           <a:p>
             <a:fld id="{1436A7A7-0319-7F44-8F6C-B5CC412837B6}" type="datetimeFigureOut">
               <a:rPr lang="en-FR" smtClean="0"/>
-              <a:t>05/11/2024</a:t>
+              <a:t>23/11/2024</a:t>
             </a:fld>
             <a:endParaRPr lang="en-FR"/>
           </a:p>
@@ -1608,7 +1608,7 @@
           <a:p>
             <a:fld id="{1436A7A7-0319-7F44-8F6C-B5CC412837B6}" type="datetimeFigureOut">
               <a:rPr lang="en-FR" smtClean="0"/>
-              <a:t>05/11/2024</a:t>
+              <a:t>23/11/2024</a:t>
             </a:fld>
             <a:endParaRPr lang="en-FR"/>
           </a:p>
@@ -1726,7 +1726,7 @@
           <a:p>
             <a:fld id="{1436A7A7-0319-7F44-8F6C-B5CC412837B6}" type="datetimeFigureOut">
               <a:rPr lang="en-FR" smtClean="0"/>
-              <a:t>05/11/2024</a:t>
+              <a:t>23/11/2024</a:t>
             </a:fld>
             <a:endParaRPr lang="en-FR"/>
           </a:p>
@@ -1821,7 +1821,7 @@
           <a:p>
             <a:fld id="{1436A7A7-0319-7F44-8F6C-B5CC412837B6}" type="datetimeFigureOut">
               <a:rPr lang="en-FR" smtClean="0"/>
-              <a:t>05/11/2024</a:t>
+              <a:t>23/11/2024</a:t>
             </a:fld>
             <a:endParaRPr lang="en-FR"/>
           </a:p>
@@ -2098,7 +2098,7 @@
           <a:p>
             <a:fld id="{1436A7A7-0319-7F44-8F6C-B5CC412837B6}" type="datetimeFigureOut">
               <a:rPr lang="en-FR" smtClean="0"/>
-              <a:t>05/11/2024</a:t>
+              <a:t>23/11/2024</a:t>
             </a:fld>
             <a:endParaRPr lang="en-FR"/>
           </a:p>
@@ -2355,7 +2355,7 @@
           <a:p>
             <a:fld id="{1436A7A7-0319-7F44-8F6C-B5CC412837B6}" type="datetimeFigureOut">
               <a:rPr lang="en-FR" smtClean="0"/>
-              <a:t>05/11/2024</a:t>
+              <a:t>23/11/2024</a:t>
             </a:fld>
             <a:endParaRPr lang="en-FR"/>
           </a:p>
@@ -2568,7 +2568,7 @@
           <a:p>
             <a:fld id="{1436A7A7-0319-7F44-8F6C-B5CC412837B6}" type="datetimeFigureOut">
               <a:rPr lang="en-FR" smtClean="0"/>
-              <a:t>05/11/2024</a:t>
+              <a:t>23/11/2024</a:t>
             </a:fld>
             <a:endParaRPr lang="en-FR"/>
           </a:p>
@@ -3958,7 +3958,7 @@
           <a:p>
             <a:pPr algn="ctr"/>
             <a:r>
-              <a:rPr lang="en-GB" b="1" dirty="0" err="1">
+              <a:rPr lang="en-GB" b="1" dirty="0">
                 <a:solidFill>
                   <a:sysClr val="windowText" lastClr="000000"/>
                 </a:solidFill>
@@ -4421,7 +4421,7 @@
           <a:p>
             <a:pPr algn="ctr"/>
             <a:r>
-              <a:rPr lang="en-GB" b="1" dirty="0" err="1">
+              <a:rPr lang="en-GB" b="1" dirty="0">
                 <a:solidFill>
                   <a:sysClr val="windowText" lastClr="000000"/>
                 </a:solidFill>
@@ -4775,7 +4775,7 @@
               <a:t>def </a:t>
             </a:r>
             <a:r>
-              <a:rPr lang="en-GB" dirty="0" err="1">
+              <a:rPr lang="en-GB" dirty="0">
                 <a:solidFill>
                   <a:sysClr val="windowText" lastClr="000000"/>
                 </a:solidFill>
@@ -5058,8 +5058,8 @@
           </a:fontRef>
         </p:style>
       </p:cxnSp>
-      <mc:AlternateContent xmlns:mc="http://schemas.openxmlformats.org/markup-compatibility/2006">
-        <mc:Choice xmlns:a14="http://schemas.microsoft.com/office/drawing/2010/main" Requires="a14">
+      <mc:AlternateContent xmlns:mc="http://schemas.openxmlformats.org/markup-compatibility/2006" xmlns:a14="http://schemas.microsoft.com/office/drawing/2010/main">
+        <mc:Choice Requires="a14">
           <p:sp>
             <p:nvSpPr>
               <p:cNvPr id="73" name="Rectangle 72">
@@ -5346,7 +5346,7 @@
             </p:txBody>
           </p:sp>
         </mc:Choice>
-        <mc:Fallback>
+        <mc:Fallback xmlns="">
           <p:sp>
             <p:nvSpPr>
               <p:cNvPr id="73" name="Rectangle 72">

</xml_diff>